<commit_message>
update after talking with MAEDA
</commit_message>
<xml_diff>
--- a/PPT/reference.pptx
+++ b/PPT/reference.pptx
@@ -11,18 +11,20 @@
     <p:sldId id="256" r:id="rId3"/>
     <p:sldId id="258" r:id="rId4"/>
     <p:sldId id="259" r:id="rId5"/>
-    <p:sldId id="262" r:id="rId6"/>
-    <p:sldId id="260" r:id="rId7"/>
+    <p:sldId id="260" r:id="rId6"/>
+    <p:sldId id="262" r:id="rId7"/>
     <p:sldId id="261" r:id="rId8"/>
     <p:sldId id="263" r:id="rId10"/>
     <p:sldId id="265" r:id="rId11"/>
     <p:sldId id="264" r:id="rId12"/>
-    <p:sldId id="257" r:id="rId13"/>
+    <p:sldId id="269" r:id="rId13"/>
+    <p:sldId id="270" r:id="rId14"/>
+    <p:sldId id="257" r:id="rId15"/>
   </p:sldIdLst>
   <p:sldSz cx="12192000" cy="6858000"/>
   <p:notesSz cx="6858000" cy="9144000"/>
   <p:custDataLst>
-    <p:tags r:id="rId17"/>
+    <p:tags r:id="rId19"/>
   </p:custDataLst>
   <p:defaultTextStyle>
     <a:defPPr>
@@ -549,6 +551,58 @@
 </file>
 
 <file path=ppt/notesSlides/notesSlide2.xml><?xml version="1.0" encoding="utf-8"?>
+<p:notes xmlns:a="http://schemas.openxmlformats.org/drawingml/2006/main" xmlns:r="http://schemas.openxmlformats.org/officeDocument/2006/relationships" xmlns:p="http://schemas.openxmlformats.org/presentationml/2006/main">
+  <p:cSld>
+    <p:spTree>
+      <p:nvGrpSpPr>
+        <p:cNvPr id="1" name=""/>
+        <p:cNvGrpSpPr/>
+        <p:nvPr/>
+      </p:nvGrpSpPr>
+      <p:grpSpPr/>
+      <p:sp>
+        <p:nvSpPr>
+          <p:cNvPr id="2" name="幻灯片图像占位符 1"/>
+          <p:cNvSpPr/>
+          <p:nvPr>
+            <p:ph type="sldImg" idx="2"/>
+          </p:nvPr>
+        </p:nvSpPr>
+        <p:spPr/>
+      </p:sp>
+      <p:sp>
+        <p:nvSpPr>
+          <p:cNvPr id="3" name="文本占位符 2"/>
+          <p:cNvSpPr/>
+          <p:nvPr>
+            <p:ph type="body" idx="3"/>
+          </p:nvPr>
+        </p:nvSpPr>
+        <p:spPr/>
+        <p:txBody>
+          <a:bodyPr/>
+          <a:p>
+            <a:r>
+              <a:rPr lang="zh-CN" altLang="en-US"/>
+              <a:t>一个可以</a:t>
+            </a:r>
+            <a:r>
+              <a:rPr lang="zh-CN" altLang="en-US"/>
+              <a:t>持续反馈vr动态物体运动状态的控制器</a:t>
+            </a:r>
+            <a:endParaRPr lang="zh-CN" altLang="en-US"/>
+          </a:p>
+        </p:txBody>
+      </p:sp>
+    </p:spTree>
+  </p:cSld>
+  <p:clrMapOvr>
+    <a:masterClrMapping/>
+  </p:clrMapOvr>
+</p:notes>
+</file>
+
+<file path=ppt/notesSlides/notesSlide3.xml><?xml version="1.0" encoding="utf-8"?>
 <p:notes xmlns:a="http://schemas.openxmlformats.org/drawingml/2006/main" xmlns:r="http://schemas.openxmlformats.org/officeDocument/2006/relationships" xmlns:p="http://schemas.openxmlformats.org/presentationml/2006/main">
   <p:cSld>
     <p:spTree>
@@ -3493,6 +3547,241 @@
 </file>
 
 <file path=ppt/slides/slide10.xml><?xml version="1.0" encoding="utf-8"?>
+<p:sld xmlns:a="http://schemas.openxmlformats.org/drawingml/2006/main" xmlns:r="http://schemas.openxmlformats.org/officeDocument/2006/relationships" xmlns:p="http://schemas.openxmlformats.org/presentationml/2006/main">
+  <p:cSld>
+    <p:spTree>
+      <p:nvGrpSpPr>
+        <p:cNvPr id="1" name=""/>
+        <p:cNvGrpSpPr/>
+        <p:nvPr/>
+      </p:nvGrpSpPr>
+      <p:grpSpPr/>
+      <p:sp>
+        <p:nvSpPr>
+          <p:cNvPr id="2" name="标题 1"/>
+          <p:cNvSpPr>
+            <a:spLocks noGrp="1"/>
+          </p:cNvSpPr>
+          <p:nvPr>
+            <p:ph type="ctrTitle"/>
+          </p:nvPr>
+        </p:nvSpPr>
+        <p:spPr/>
+        <p:txBody>
+          <a:bodyPr>
+            <a:normAutofit/>
+          </a:bodyPr>
+          <a:p>
+            <a:r>
+              <a:rPr lang="zh-CN" altLang="en-US"/>
+              <a:t>A</a:t>
+            </a:r>
+            <a:r>
+              <a:rPr lang="en-US" altLang="zh-CN"/>
+              <a:t> continuous</a:t>
+            </a:r>
+            <a:r>
+              <a:rPr lang="zh-CN" altLang="en-US"/>
+              <a:t> </a:t>
+            </a:r>
+            <a:r>
+              <a:rPr lang="en-US" altLang="zh-CN"/>
+              <a:t>motion feedback </a:t>
+            </a:r>
+            <a:r>
+              <a:rPr lang="zh-CN" altLang="en-US"/>
+              <a:t>controller</a:t>
+            </a:r>
+            <a:endParaRPr lang="zh-CN" altLang="en-US"/>
+          </a:p>
+        </p:txBody>
+      </p:sp>
+      <p:sp>
+        <p:nvSpPr>
+          <p:cNvPr id="3" name="副标题 2"/>
+          <p:cNvSpPr>
+            <a:spLocks noGrp="1"/>
+          </p:cNvSpPr>
+          <p:nvPr>
+            <p:ph type="subTitle" idx="1"/>
+          </p:nvPr>
+        </p:nvSpPr>
+        <p:spPr/>
+        <p:txBody>
+          <a:bodyPr/>
+          <a:p>
+            <a:r>
+              <a:rPr lang="zh-CN" altLang="en-US">
+                <a:sym typeface="+mn-ea"/>
+              </a:rPr>
+              <a:t>A</a:t>
+            </a:r>
+            <a:r>
+              <a:rPr lang="en-US" altLang="zh-CN">
+                <a:sym typeface="+mn-ea"/>
+              </a:rPr>
+              <a:t> </a:t>
+            </a:r>
+            <a:r>
+              <a:rPr lang="zh-CN" altLang="en-US">
+                <a:sym typeface="+mn-ea"/>
+              </a:rPr>
+              <a:t>controller that can </a:t>
+            </a:r>
+            <a:r>
+              <a:rPr lang="en-US" altLang="zh-CN">
+                <a:sym typeface="+mn-ea"/>
+              </a:rPr>
+              <a:t>continuously </a:t>
+            </a:r>
+            <a:r>
+              <a:rPr lang="zh-CN" altLang="en-US">
+                <a:sym typeface="+mn-ea"/>
+              </a:rPr>
+              <a:t>feedback the motion state of dynamic objects</a:t>
+            </a:r>
+            <a:r>
+              <a:rPr lang="en-US" altLang="zh-CN">
+                <a:sym typeface="+mn-ea"/>
+              </a:rPr>
+              <a:t> under VR environment</a:t>
+            </a:r>
+            <a:endParaRPr lang="en-US" altLang="zh-CN">
+              <a:sym typeface="+mn-ea"/>
+            </a:endParaRPr>
+          </a:p>
+        </p:txBody>
+      </p:sp>
+      <p:sp>
+        <p:nvSpPr>
+          <p:cNvPr id="4" name="灯片编号占位符 3"/>
+          <p:cNvSpPr>
+            <a:spLocks noGrp="1"/>
+          </p:cNvSpPr>
+          <p:nvPr>
+            <p:ph type="sldNum" sz="quarter" idx="12"/>
+          </p:nvPr>
+        </p:nvSpPr>
+        <p:spPr/>
+        <p:txBody>
+          <a:bodyPr/>
+          <a:p>
+            <a:fld id="{565CE74E-AB26-4998-AD42-012C4C1AD076}" type="slidenum">
+              <a:rPr lang="zh-CN" altLang="en-US" smtClean="0"/>
+            </a:fld>
+            <a:endParaRPr lang="zh-CN" altLang="en-US"/>
+          </a:p>
+        </p:txBody>
+      </p:sp>
+    </p:spTree>
+  </p:cSld>
+  <p:clrMapOvr>
+    <a:masterClrMapping/>
+  </p:clrMapOvr>
+</p:sld>
+</file>
+
+<file path=ppt/slides/slide11.xml><?xml version="1.0" encoding="utf-8"?>
+<p:sld xmlns:a="http://schemas.openxmlformats.org/drawingml/2006/main" xmlns:r="http://schemas.openxmlformats.org/officeDocument/2006/relationships" xmlns:p="http://schemas.openxmlformats.org/presentationml/2006/main">
+  <p:cSld>
+    <p:spTree>
+      <p:nvGrpSpPr>
+        <p:cNvPr id="1" name=""/>
+        <p:cNvGrpSpPr/>
+        <p:nvPr/>
+      </p:nvGrpSpPr>
+      <p:grpSpPr/>
+      <p:sp>
+        <p:nvSpPr>
+          <p:cNvPr id="2" name="标题 1"/>
+          <p:cNvSpPr>
+            <a:spLocks noGrp="1"/>
+          </p:cNvSpPr>
+          <p:nvPr>
+            <p:ph type="title"/>
+          </p:nvPr>
+        </p:nvSpPr>
+        <p:spPr/>
+        <p:txBody>
+          <a:bodyPr/>
+          <a:p>
+            <a:endParaRPr lang="zh-CN" altLang="en-US"/>
+          </a:p>
+        </p:txBody>
+      </p:sp>
+      <p:sp>
+        <p:nvSpPr>
+          <p:cNvPr id="3" name="内容占位符 2"/>
+          <p:cNvSpPr>
+            <a:spLocks noGrp="1"/>
+          </p:cNvSpPr>
+          <p:nvPr>
+            <p:ph idx="1"/>
+          </p:nvPr>
+        </p:nvSpPr>
+        <p:spPr/>
+        <p:txBody>
+          <a:bodyPr/>
+          <a:p>
+            <a:pPr marL="0" indent="0">
+              <a:buNone/>
+            </a:pPr>
+            <a:r>
+              <a:rPr lang="en-US" altLang="en-US"/>
+              <a:t>&gt; </a:t>
+            </a:r>
+            <a:r>
+              <a:rPr lang="zh-CN" altLang="en-US"/>
+              <a:t>A Survey on Simulation for Weight Perception in Virtual Reality</a:t>
+            </a:r>
+            <a:endParaRPr lang="zh-CN" altLang="en-US"/>
+          </a:p>
+          <a:p>
+            <a:endParaRPr lang="zh-CN" altLang="en-US"/>
+          </a:p>
+          <a:p>
+            <a:r>
+              <a:rPr lang="en-US" altLang="zh-CN"/>
+              <a:t>I</a:t>
+            </a:r>
+            <a:r>
+              <a:rPr lang="zh-CN" altLang="en-US"/>
+              <a:t>nconsistency of vistual feedback and real hand motion</a:t>
+            </a:r>
+            <a:endParaRPr lang="zh-CN" altLang="en-US"/>
+          </a:p>
+        </p:txBody>
+      </p:sp>
+      <p:sp>
+        <p:nvSpPr>
+          <p:cNvPr id="4" name="灯片编号占位符 3"/>
+          <p:cNvSpPr>
+            <a:spLocks noGrp="1"/>
+          </p:cNvSpPr>
+          <p:nvPr>
+            <p:ph type="sldNum" sz="quarter" idx="12"/>
+          </p:nvPr>
+        </p:nvSpPr>
+        <p:spPr/>
+        <p:txBody>
+          <a:bodyPr/>
+          <a:p>
+            <a:fld id="{565CE74E-AB26-4998-AD42-012C4C1AD076}" type="slidenum">
+              <a:rPr lang="zh-CN" altLang="en-US" smtClean="0"/>
+            </a:fld>
+            <a:endParaRPr lang="zh-CN" altLang="en-US"/>
+          </a:p>
+        </p:txBody>
+      </p:sp>
+    </p:spTree>
+  </p:cSld>
+  <p:clrMapOvr>
+    <a:masterClrMapping/>
+  </p:clrMapOvr>
+</p:sld>
+</file>
+
+<file path=ppt/slides/slide12.xml><?xml version="1.0" encoding="utf-8"?>
 <p:sld xmlns:a="http://schemas.openxmlformats.org/drawingml/2006/main" xmlns:r="http://schemas.openxmlformats.org/officeDocument/2006/relationships" xmlns:p="http://schemas.openxmlformats.org/presentationml/2006/main" show="0">
   <p:cSld>
     <p:spTree>
@@ -3881,6 +4170,157 @@
         <p:nvPr/>
       </p:nvGrpSpPr>
       <p:grpSpPr/>
+      <p:pic>
+        <p:nvPicPr>
+          <p:cNvPr id="6" name="图片 5" descr="005"/>
+          <p:cNvPicPr>
+            <a:picLocks noChangeAspect="1"/>
+          </p:cNvPicPr>
+          <p:nvPr>
+            <p:custDataLst>
+              <p:tags r:id="rId1"/>
+            </p:custDataLst>
+          </p:nvPr>
+        </p:nvPicPr>
+        <p:blipFill>
+          <a:blip r:embed="rId2"/>
+          <a:stretch>
+            <a:fillRect/>
+          </a:stretch>
+        </p:blipFill>
+        <p:spPr>
+          <a:xfrm>
+            <a:off x="4140200" y="528955"/>
+            <a:ext cx="7537450" cy="5800090"/>
+          </a:xfrm>
+          <a:prstGeom prst="rect">
+            <a:avLst/>
+          </a:prstGeom>
+        </p:spPr>
+      </p:pic>
+      <p:sp>
+        <p:nvSpPr>
+          <p:cNvPr id="2" name="标题 1"/>
+          <p:cNvSpPr>
+            <a:spLocks noGrp="1"/>
+          </p:cNvSpPr>
+          <p:nvPr>
+            <p:ph type="title"/>
+          </p:nvPr>
+        </p:nvSpPr>
+        <p:spPr/>
+        <p:txBody>
+          <a:bodyPr/>
+          <a:p>
+            <a:r>
+              <a:rPr lang="en-US" altLang="zh-CN"/>
+              <a:t>catalog by keywords</a:t>
+            </a:r>
+            <a:endParaRPr lang="en-US" altLang="zh-CN"/>
+          </a:p>
+        </p:txBody>
+      </p:sp>
+      <p:sp>
+        <p:nvSpPr>
+          <p:cNvPr id="3" name="内容占位符 2"/>
+          <p:cNvSpPr>
+            <a:spLocks noGrp="1"/>
+          </p:cNvSpPr>
+          <p:nvPr>
+            <p:ph idx="1"/>
+          </p:nvPr>
+        </p:nvSpPr>
+        <p:spPr>
+          <a:xfrm>
+            <a:off x="838200" y="1825625"/>
+            <a:ext cx="3483610" cy="4351655"/>
+          </a:xfrm>
+        </p:spPr>
+        <p:txBody>
+          <a:bodyPr/>
+          <a:p>
+            <a:pPr marL="0" indent="0">
+              <a:buNone/>
+            </a:pPr>
+            <a:r>
+              <a:rPr lang="zh-CN" altLang="en-US" sz="2000"/>
+              <a:t>criteria：</a:t>
+            </a:r>
+            <a:endParaRPr lang="zh-CN" altLang="en-US" sz="2000"/>
+          </a:p>
+          <a:p>
+            <a:r>
+              <a:rPr lang="en-US" altLang="zh-CN" sz="2000"/>
+              <a:t>keyword</a:t>
+            </a:r>
+            <a:endParaRPr lang="en-US" altLang="zh-CN" sz="2000"/>
+          </a:p>
+          <a:p>
+            <a:r>
+              <a:rPr lang="en-US" altLang="zh-CN" sz="2000"/>
+              <a:t>abstract &amp; introduction</a:t>
+            </a:r>
+            <a:endParaRPr lang="en-US" altLang="zh-CN" sz="2000"/>
+          </a:p>
+          <a:p>
+            <a:r>
+              <a:rPr lang="en-US" altLang="zh-CN" sz="2000"/>
+              <a:t>compared to others</a:t>
+            </a:r>
+            <a:endParaRPr lang="en-US" altLang="zh-CN" sz="2000"/>
+          </a:p>
+          <a:p>
+            <a:pPr marL="0" indent="0">
+              <a:buNone/>
+            </a:pPr>
+            <a:r>
+              <a:rPr lang="en-US" altLang="zh-CN" sz="1600"/>
+              <a:t>*Not classified to the category when it is not mentioned the concept.</a:t>
+            </a:r>
+            <a:endParaRPr lang="en-US" altLang="zh-CN" sz="1600"/>
+          </a:p>
+        </p:txBody>
+      </p:sp>
+      <p:sp>
+        <p:nvSpPr>
+          <p:cNvPr id="5" name="灯片编号占位符 4"/>
+          <p:cNvSpPr>
+            <a:spLocks noGrp="1"/>
+          </p:cNvSpPr>
+          <p:nvPr>
+            <p:ph type="sldNum" sz="quarter" idx="12"/>
+          </p:nvPr>
+        </p:nvSpPr>
+        <p:spPr/>
+        <p:txBody>
+          <a:bodyPr/>
+          <a:p>
+            <a:fld id="{565CE74E-AB26-4998-AD42-012C4C1AD076}" type="slidenum">
+              <a:rPr lang="zh-CN" altLang="en-US" smtClean="0"/>
+            </a:fld>
+            <a:endParaRPr lang="zh-CN" altLang="en-US"/>
+          </a:p>
+        </p:txBody>
+      </p:sp>
+    </p:spTree>
+  </p:cSld>
+  <p:clrMapOvr>
+    <a:masterClrMapping/>
+  </p:clrMapOvr>
+  <p:transition/>
+</p:sld>
+</file>
+
+<file path=ppt/slides/slide5.xml><?xml version="1.0" encoding="utf-8"?>
+<p:sld xmlns:a="http://schemas.openxmlformats.org/drawingml/2006/main" xmlns:r="http://schemas.openxmlformats.org/officeDocument/2006/relationships" xmlns:p="http://schemas.openxmlformats.org/presentationml/2006/main">
+  <p:cSld>
+    <p:spTree>
+      <p:nvGrpSpPr>
+        <p:cNvPr id="1" name=""/>
+        <p:cNvGrpSpPr/>
+        <p:nvPr/>
+      </p:nvGrpSpPr>
+      <p:grpSpPr/>
       <p:sp>
         <p:nvSpPr>
           <p:cNvPr id="2" name="标题 1"/>
@@ -3996,157 +4436,6 @@
   <p:clrMapOvr>
     <a:masterClrMapping/>
   </p:clrMapOvr>
-</p:sld>
-</file>
-
-<file path=ppt/slides/slide5.xml><?xml version="1.0" encoding="utf-8"?>
-<p:sld xmlns:a="http://schemas.openxmlformats.org/drawingml/2006/main" xmlns:r="http://schemas.openxmlformats.org/officeDocument/2006/relationships" xmlns:p="http://schemas.openxmlformats.org/presentationml/2006/main">
-  <p:cSld>
-    <p:spTree>
-      <p:nvGrpSpPr>
-        <p:cNvPr id="1" name=""/>
-        <p:cNvGrpSpPr/>
-        <p:nvPr/>
-      </p:nvGrpSpPr>
-      <p:grpSpPr/>
-      <p:pic>
-        <p:nvPicPr>
-          <p:cNvPr id="6" name="图片 5" descr="005"/>
-          <p:cNvPicPr>
-            <a:picLocks noChangeAspect="1"/>
-          </p:cNvPicPr>
-          <p:nvPr>
-            <p:custDataLst>
-              <p:tags r:id="rId1"/>
-            </p:custDataLst>
-          </p:nvPr>
-        </p:nvPicPr>
-        <p:blipFill>
-          <a:blip r:embed="rId2"/>
-          <a:stretch>
-            <a:fillRect/>
-          </a:stretch>
-        </p:blipFill>
-        <p:spPr>
-          <a:xfrm>
-            <a:off x="4140200" y="528955"/>
-            <a:ext cx="7537450" cy="5800090"/>
-          </a:xfrm>
-          <a:prstGeom prst="rect">
-            <a:avLst/>
-          </a:prstGeom>
-        </p:spPr>
-      </p:pic>
-      <p:sp>
-        <p:nvSpPr>
-          <p:cNvPr id="2" name="标题 1"/>
-          <p:cNvSpPr>
-            <a:spLocks noGrp="1"/>
-          </p:cNvSpPr>
-          <p:nvPr>
-            <p:ph type="title"/>
-          </p:nvPr>
-        </p:nvSpPr>
-        <p:spPr/>
-        <p:txBody>
-          <a:bodyPr/>
-          <a:p>
-            <a:r>
-              <a:rPr lang="en-US" altLang="zh-CN"/>
-              <a:t>catalog by keywords</a:t>
-            </a:r>
-            <a:endParaRPr lang="en-US" altLang="zh-CN"/>
-          </a:p>
-        </p:txBody>
-      </p:sp>
-      <p:sp>
-        <p:nvSpPr>
-          <p:cNvPr id="3" name="内容占位符 2"/>
-          <p:cNvSpPr>
-            <a:spLocks noGrp="1"/>
-          </p:cNvSpPr>
-          <p:nvPr>
-            <p:ph idx="1"/>
-          </p:nvPr>
-        </p:nvSpPr>
-        <p:spPr>
-          <a:xfrm>
-            <a:off x="838200" y="1825625"/>
-            <a:ext cx="3483610" cy="4351655"/>
-          </a:xfrm>
-        </p:spPr>
-        <p:txBody>
-          <a:bodyPr/>
-          <a:p>
-            <a:pPr marL="0" indent="0">
-              <a:buNone/>
-            </a:pPr>
-            <a:r>
-              <a:rPr lang="zh-CN" altLang="en-US" sz="2000"/>
-              <a:t>criteria：</a:t>
-            </a:r>
-            <a:endParaRPr lang="zh-CN" altLang="en-US" sz="2000"/>
-          </a:p>
-          <a:p>
-            <a:r>
-              <a:rPr lang="en-US" altLang="zh-CN" sz="2000"/>
-              <a:t>keyword</a:t>
-            </a:r>
-            <a:endParaRPr lang="en-US" altLang="zh-CN" sz="2000"/>
-          </a:p>
-          <a:p>
-            <a:r>
-              <a:rPr lang="en-US" altLang="zh-CN" sz="2000"/>
-              <a:t>abstract &amp; introduction</a:t>
-            </a:r>
-            <a:endParaRPr lang="en-US" altLang="zh-CN" sz="2000"/>
-          </a:p>
-          <a:p>
-            <a:r>
-              <a:rPr lang="en-US" altLang="zh-CN" sz="2000"/>
-              <a:t>compared to others</a:t>
-            </a:r>
-            <a:endParaRPr lang="en-US" altLang="zh-CN" sz="2000"/>
-          </a:p>
-          <a:p>
-            <a:pPr marL="0" indent="0">
-              <a:buNone/>
-            </a:pPr>
-            <a:r>
-              <a:rPr lang="en-US" altLang="zh-CN" sz="1600"/>
-              <a:t>*Not classified to the category when it is not mentioned the concept.</a:t>
-            </a:r>
-            <a:endParaRPr lang="en-US" altLang="zh-CN" sz="1600"/>
-          </a:p>
-        </p:txBody>
-      </p:sp>
-      <p:sp>
-        <p:nvSpPr>
-          <p:cNvPr id="5" name="灯片编号占位符 4"/>
-          <p:cNvSpPr>
-            <a:spLocks noGrp="1"/>
-          </p:cNvSpPr>
-          <p:nvPr>
-            <p:ph type="sldNum" sz="quarter" idx="12"/>
-          </p:nvPr>
-        </p:nvSpPr>
-        <p:spPr/>
-        <p:txBody>
-          <a:bodyPr/>
-          <a:p>
-            <a:fld id="{565CE74E-AB26-4998-AD42-012C4C1AD076}" type="slidenum">
-              <a:rPr lang="zh-CN" altLang="en-US" smtClean="0"/>
-            </a:fld>
-            <a:endParaRPr lang="zh-CN" altLang="en-US"/>
-          </a:p>
-        </p:txBody>
-      </p:sp>
-    </p:spTree>
-  </p:cSld>
-  <p:clrMapOvr>
-    <a:masterClrMapping/>
-  </p:clrMapOvr>
-  <p:transition/>
 </p:sld>
 </file>
 

</xml_diff>